<commit_message>
Add images in presentation
</commit_message>
<xml_diff>
--- a/Documentation/Presentation - Team NEWT.pptx
+++ b/Documentation/Presentation - Team NEWT.pptx
@@ -1421,7 +1421,7 @@
         </p:blipFill>
         <p:spPr>
           <a:xfrm>
-            <a:off x="0" y="0"/>
+            <a:off x="0" y="-14288"/>
             <a:ext cx="18288000" cy="9477375"/>
           </a:xfrm>
           <a:prstGeom prst="rect">
@@ -1511,6 +1511,146 @@
           </a:p>
         </p:txBody>
       </p:sp>
+      <p:pic>
+        <p:nvPicPr>
+          <p:cNvPr id="16" name="Picture 15" descr="A picture containing clothing&#10;&#10;Description automatically generated">
+            <a:extLst>
+              <a:ext uri="{FF2B5EF4-FFF2-40B4-BE49-F238E27FC236}">
+                <a16:creationId xmlns:a16="http://schemas.microsoft.com/office/drawing/2014/main" id="{7549E6E1-0697-45F3-B4DC-04CDD2FDE464}"/>
+              </a:ext>
+            </a:extLst>
+          </p:cNvPr>
+          <p:cNvPicPr>
+            <a:picLocks noChangeAspect="1"/>
+          </p:cNvPicPr>
+          <p:nvPr/>
+        </p:nvPicPr>
+        <p:blipFill>
+          <a:blip r:embed="rId12"/>
+          <a:stretch>
+            <a:fillRect/>
+          </a:stretch>
+        </p:blipFill>
+        <p:spPr>
+          <a:xfrm>
+            <a:off x="6141897" y="3630967"/>
+            <a:ext cx="2618951" cy="2824182"/>
+          </a:xfrm>
+          <a:prstGeom prst="rect">
+            <a:avLst/>
+          </a:prstGeom>
+          <a:ln>
+            <a:solidFill>
+              <a:srgbClr val="DAA520"/>
+            </a:solidFill>
+          </a:ln>
+        </p:spPr>
+      </p:pic>
+      <p:pic>
+        <p:nvPicPr>
+          <p:cNvPr id="22" name="Picture 21" descr="A picture containing person, wall, indoor, posing&#10;&#10;Description automatically generated">
+            <a:extLst>
+              <a:ext uri="{FF2B5EF4-FFF2-40B4-BE49-F238E27FC236}">
+                <a16:creationId xmlns:a16="http://schemas.microsoft.com/office/drawing/2014/main" id="{2DCE55C3-CD0B-424E-BB3A-4D295805FD79}"/>
+              </a:ext>
+            </a:extLst>
+          </p:cNvPr>
+          <p:cNvPicPr>
+            <a:picLocks noChangeAspect="1"/>
+          </p:cNvPicPr>
+          <p:nvPr/>
+        </p:nvPicPr>
+        <p:blipFill>
+          <a:blip r:embed="rId13"/>
+          <a:stretch>
+            <a:fillRect/>
+          </a:stretch>
+        </p:blipFill>
+        <p:spPr>
+          <a:xfrm>
+            <a:off x="3324866" y="3630967"/>
+            <a:ext cx="2496990" cy="2824182"/>
+          </a:xfrm>
+          <a:prstGeom prst="rect">
+            <a:avLst/>
+          </a:prstGeom>
+          <a:ln>
+            <a:solidFill>
+              <a:srgbClr val="DAA520"/>
+            </a:solidFill>
+          </a:ln>
+        </p:spPr>
+      </p:pic>
+      <p:pic>
+        <p:nvPicPr>
+          <p:cNvPr id="24" name="Picture 23" descr="A person wearing glasses&#10;&#10;Description automatically generated with medium confidence">
+            <a:extLst>
+              <a:ext uri="{FF2B5EF4-FFF2-40B4-BE49-F238E27FC236}">
+                <a16:creationId xmlns:a16="http://schemas.microsoft.com/office/drawing/2014/main" id="{6EA96FF9-D44F-4A1C-BF4F-AE7FB28C885D}"/>
+              </a:ext>
+            </a:extLst>
+          </p:cNvPr>
+          <p:cNvPicPr>
+            <a:picLocks noChangeAspect="1"/>
+          </p:cNvPicPr>
+          <p:nvPr/>
+        </p:nvPicPr>
+        <p:blipFill>
+          <a:blip r:embed="rId14"/>
+          <a:stretch>
+            <a:fillRect/>
+          </a:stretch>
+        </p:blipFill>
+        <p:spPr>
+          <a:xfrm>
+            <a:off x="9144000" y="3622690"/>
+            <a:ext cx="2824182" cy="2824182"/>
+          </a:xfrm>
+          <a:prstGeom prst="rect">
+            <a:avLst/>
+          </a:prstGeom>
+          <a:ln>
+            <a:solidFill>
+              <a:srgbClr val="DAA520"/>
+            </a:solidFill>
+          </a:ln>
+        </p:spPr>
+      </p:pic>
+      <p:pic>
+        <p:nvPicPr>
+          <p:cNvPr id="26" name="Picture 25" descr="A picture containing person, wall, clothing, indoor&#10;&#10;Description automatically generated">
+            <a:extLst>
+              <a:ext uri="{FF2B5EF4-FFF2-40B4-BE49-F238E27FC236}">
+                <a16:creationId xmlns:a16="http://schemas.microsoft.com/office/drawing/2014/main" id="{5AF01628-B56B-4A56-8FFD-B96A825362B9}"/>
+              </a:ext>
+            </a:extLst>
+          </p:cNvPr>
+          <p:cNvPicPr>
+            <a:picLocks noChangeAspect="1"/>
+          </p:cNvPicPr>
+          <p:nvPr/>
+        </p:nvPicPr>
+        <p:blipFill>
+          <a:blip r:embed="rId15"/>
+          <a:stretch>
+            <a:fillRect/>
+          </a:stretch>
+        </p:blipFill>
+        <p:spPr>
+          <a:xfrm>
+            <a:off x="12351334" y="3632929"/>
+            <a:ext cx="2822220" cy="2822220"/>
+          </a:xfrm>
+          <a:prstGeom prst="rect">
+            <a:avLst/>
+          </a:prstGeom>
+          <a:ln>
+            <a:solidFill>
+              <a:srgbClr val="DAA520"/>
+            </a:solidFill>
+          </a:ln>
+        </p:spPr>
+      </p:pic>
     </p:spTree>
   </p:cSld>
   <p:clrMapOvr>
@@ -1671,35 +1811,6 @@
           <a:xfrm>
             <a:off x="7581900" y="3619500"/>
             <a:ext cx="9667875" cy="5438775"/>
-          </a:xfrm>
-          <a:prstGeom prst="rect">
-            <a:avLst/>
-          </a:prstGeom>
-        </p:spPr>
-      </p:pic>
-      <p:pic>
-        <p:nvPicPr>
-          <p:cNvPr id="7" name="Object 6" descr="preencoded.png"/>
-          <p:cNvPicPr>
-            <a:picLocks noChangeAspect="1"/>
-          </p:cNvPicPr>
-          <p:nvPr/>
-        </p:nvPicPr>
-        <p:blipFill>
-          <a:blip r:embed="rId11">
-            <a:extLst>
-              <a:ext uri="{96DAC541-7B7A-43D3-8B79-37D633B846F1}">
-                <asvg:svgBlip xmlns:asvg="http://schemas.microsoft.com/office/drawing/2016/SVG/main" r:embed="rId12"/>
-              </a:ext>
-            </a:extLst>
-          </a:blip>
-          <a:srcRect/>
-          <a:stretch/>
-        </p:blipFill>
-        <p:spPr>
-          <a:xfrm>
-            <a:off x="0" y="771525"/>
-            <a:ext cx="5562609" cy="18288"/>
           </a:xfrm>
           <a:prstGeom prst="rect">
             <a:avLst/>
@@ -2028,7 +2139,7 @@
               </a:lnSpc>
             </a:pPr>
             <a:r>
-              <a:rPr lang="en-US" sz="4800" b="0" i="0" kern="0" spc="1200" dirty="0">
+              <a:rPr lang="en-US" sz="4800" kern="0" spc="1200" dirty="0">
                 <a:solidFill>
                   <a:srgbClr val="2C3C45"/>
                 </a:solidFill>
@@ -2039,9 +2150,9 @@
               <a:t>4</a:t>
             </a:r>
             <a:r>
-              <a:rPr lang="en-US" sz="4800" b="0" i="0" kern="0" spc="1200" dirty="0">
+              <a:rPr lang="en-US" sz="4800" kern="0" spc="1200" dirty="0">
                 <a:solidFill>
-                  <a:srgbClr val="D8264E"/>
+                  <a:srgbClr val="DAA520"/>
                 </a:solidFill>
                 <a:latin typeface="Comfortaa Regular" pitchFamily="34" charset="0"/>
                 <a:ea typeface="Comfortaa Regular" pitchFamily="34" charset="-122"/>
@@ -2104,7 +2215,7 @@
             <a:r>
               <a:rPr lang="en-US" sz="4800" b="0" i="0" kern="0" spc="1200" dirty="0">
                 <a:solidFill>
-                  <a:srgbClr val="D8264E"/>
+                  <a:srgbClr val="DAA520"/>
                 </a:solidFill>
                 <a:latin typeface="Comfortaa Regular" pitchFamily="34" charset="0"/>
                 <a:ea typeface="Comfortaa Regular" pitchFamily="34" charset="-122"/>
@@ -2167,7 +2278,7 @@
             <a:r>
               <a:rPr lang="en-US" sz="4800" b="0" i="0" kern="0" spc="1200" dirty="0">
                 <a:solidFill>
-                  <a:srgbClr val="D8264E"/>
+                  <a:srgbClr val="DAA520"/>
                 </a:solidFill>
                 <a:latin typeface="Comfortaa Regular" pitchFamily="34" charset="0"/>
                 <a:ea typeface="Comfortaa Regular" pitchFamily="34" charset="-122"/>
@@ -2230,7 +2341,7 @@
             <a:r>
               <a:rPr lang="en-US" sz="4800" b="0" i="0" kern="0" spc="1728" dirty="0">
                 <a:solidFill>
-                  <a:srgbClr val="D8264E"/>
+                  <a:srgbClr val="DAA520"/>
                 </a:solidFill>
                 <a:latin typeface="Comfortaa Regular" pitchFamily="34" charset="0"/>
                 <a:ea typeface="Comfortaa Regular" pitchFamily="34" charset="-122"/>
@@ -2261,7 +2372,7 @@
         </p:nvSpPr>
         <p:spPr>
           <a:xfrm>
-            <a:off x="1807669" y="4800600"/>
+            <a:off x="1710015" y="4805362"/>
             <a:ext cx="4828620" cy="676275"/>
           </a:xfrm>
           <a:prstGeom prst="rect">
@@ -2274,7 +2385,7 @@
           <a:bodyPr wrap="square" lIns="0" tIns="0" rIns="0" bIns="0" rtlCol="0" anchor="ctr"/>
           <a:lstStyle/>
           <a:p>
-            <a:pPr algn="l">
+            <a:pPr algn="ctr">
               <a:lnSpc>
                 <a:spcPts val="5775"/>
               </a:lnSpc>
@@ -2410,35 +2521,6 @@
       </p:pic>
       <p:pic>
         <p:nvPicPr>
-          <p:cNvPr id="5" name="Object 4" descr="preencoded.png"/>
-          <p:cNvPicPr>
-            <a:picLocks noChangeAspect="1"/>
-          </p:cNvPicPr>
-          <p:nvPr/>
-        </p:nvPicPr>
-        <p:blipFill>
-          <a:blip r:embed="rId8">
-            <a:extLst>
-              <a:ext uri="{96DAC541-7B7A-43D3-8B79-37D633B846F1}">
-                <asvg:svgBlip xmlns:asvg="http://schemas.microsoft.com/office/drawing/2016/SVG/main" r:embed="rId9"/>
-              </a:ext>
-            </a:extLst>
-          </a:blip>
-          <a:srcRect/>
-          <a:stretch/>
-        </p:blipFill>
-        <p:spPr>
-          <a:xfrm>
-            <a:off x="15563850" y="9639300"/>
-            <a:ext cx="2276475" cy="219075"/>
-          </a:xfrm>
-          <a:prstGeom prst="rect">
-            <a:avLst/>
-          </a:prstGeom>
-        </p:spPr>
-      </p:pic>
-      <p:pic>
-        <p:nvPicPr>
           <p:cNvPr id="6" name="Object 5" descr="preencoded.png"/>
           <p:cNvPicPr>
             <a:picLocks noChangeAspect="1"/>
@@ -2446,7 +2528,7 @@
           <p:nvPr/>
         </p:nvPicPr>
         <p:blipFill>
-          <a:blip r:embed="rId10"/>
+          <a:blip r:embed="rId8"/>
           <a:srcRect/>
           <a:stretch/>
         </p:blipFill>
@@ -2489,7 +2571,7 @@
             <a:r>
               <a:rPr lang="en-US" sz="1350" b="0" i="0" kern="0" spc="1046" dirty="0">
                 <a:solidFill>
-                  <a:srgbClr val="D8264E"/>
+                  <a:srgbClr val="DAA520"/>
                 </a:solidFill>
                 <a:latin typeface="Comfortaa Regular" pitchFamily="34" charset="0"/>
                 <a:ea typeface="Comfortaa Regular" pitchFamily="34" charset="-122"/>
@@ -2497,7 +2579,11 @@
               </a:rPr>
               <a:t>TEAM NEWT</a:t>
             </a:r>
-            <a:endParaRPr lang="en-US" sz="1350" dirty="0"/>
+            <a:endParaRPr lang="en-US" sz="1350" dirty="0">
+              <a:solidFill>
+                <a:srgbClr val="DAA520"/>
+              </a:solidFill>
+            </a:endParaRPr>
           </a:p>
         </p:txBody>
       </p:sp>
@@ -2648,37 +2734,8 @@
         </p:blipFill>
         <p:spPr>
           <a:xfrm>
-            <a:off x="1409700" y="1514475"/>
+            <a:off x="1966912" y="1714500"/>
             <a:ext cx="15468600" cy="7248525"/>
-          </a:xfrm>
-          <a:prstGeom prst="rect">
-            <a:avLst/>
-          </a:prstGeom>
-        </p:spPr>
-      </p:pic>
-      <p:pic>
-        <p:nvPicPr>
-          <p:cNvPr id="5" name="Object 4" descr="preencoded.png"/>
-          <p:cNvPicPr>
-            <a:picLocks noChangeAspect="1"/>
-          </p:cNvPicPr>
-          <p:nvPr/>
-        </p:nvPicPr>
-        <p:blipFill>
-          <a:blip r:embed="rId8">
-            <a:extLst>
-              <a:ext uri="{96DAC541-7B7A-43D3-8B79-37D633B846F1}">
-                <asvg:svgBlip xmlns:asvg="http://schemas.microsoft.com/office/drawing/2016/SVG/main" r:embed="rId9"/>
-              </a:ext>
-            </a:extLst>
-          </a:blip>
-          <a:srcRect/>
-          <a:stretch/>
-        </p:blipFill>
-        <p:spPr>
-          <a:xfrm>
-            <a:off x="285750" y="390525"/>
-            <a:ext cx="2247900" cy="219075"/>
           </a:xfrm>
           <a:prstGeom prst="rect">
             <a:avLst/>
@@ -2714,7 +2771,7 @@
             <a:r>
               <a:rPr lang="en-US" sz="1350" b="0" i="0" kern="0" spc="1046" dirty="0">
                 <a:solidFill>
-                  <a:srgbClr val="D8264E"/>
+                  <a:srgbClr val="DAA520"/>
                 </a:solidFill>
                 <a:latin typeface="Comfortaa Regular" pitchFamily="34" charset="0"/>
                 <a:ea typeface="Comfortaa Regular" pitchFamily="34" charset="-122"/>
@@ -2722,7 +2779,11 @@
               </a:rPr>
               <a:t>TEAM NEWT</a:t>
             </a:r>
-            <a:endParaRPr lang="en-US" sz="1350" dirty="0"/>
+            <a:endParaRPr lang="en-US" sz="1350" dirty="0">
+              <a:solidFill>
+                <a:srgbClr val="DAA520"/>
+              </a:solidFill>
+            </a:endParaRPr>
           </a:p>
         </p:txBody>
       </p:sp>

</xml_diff>

<commit_message>
Fix the page transition
</commit_message>
<xml_diff>
--- a/Documentation/Presentation - Team NEWT.pptx
+++ b/Documentation/Presentation - Team NEWT.pptx
@@ -1095,7 +1095,7 @@
           <a:blip r:embed="rId3">
             <a:extLst>
               <a:ext uri="{96DAC541-7B7A-43D3-8B79-37D633B846F1}">
-                <asvg:svgBlip xmlns:asvg="http://schemas.microsoft.com/office/drawing/2016/SVG/main" r:embed="rId4"/>
+                <asvg:svgBlip xmlns:asvg="http://schemas.microsoft.com/office/drawing/2016/SVG/main" xmlns="" r:embed="rId4"/>
               </a:ext>
             </a:extLst>
           </a:blip>
@@ -1147,7 +1147,7 @@
           <a:blip r:embed="rId6">
             <a:extLst>
               <a:ext uri="{96DAC541-7B7A-43D3-8B79-37D633B846F1}">
-                <asvg:svgBlip xmlns:asvg="http://schemas.microsoft.com/office/drawing/2016/SVG/main" r:embed="rId7"/>
+                <asvg:svgBlip xmlns:asvg="http://schemas.microsoft.com/office/drawing/2016/SVG/main" xmlns="" r:embed="rId7"/>
               </a:ext>
             </a:extLst>
           </a:blip>
@@ -1176,7 +1176,7 @@
           <a:blip r:embed="rId8">
             <a:extLst>
               <a:ext uri="{96DAC541-7B7A-43D3-8B79-37D633B846F1}">
-                <asvg:svgBlip xmlns:asvg="http://schemas.microsoft.com/office/drawing/2016/SVG/main" r:embed="rId9"/>
+                <asvg:svgBlip xmlns:asvg="http://schemas.microsoft.com/office/drawing/2016/SVG/main" xmlns="" r:embed="rId9"/>
               </a:ext>
             </a:extLst>
           </a:blip>
@@ -1302,7 +1302,7 @@
           <a:blip r:embed="rId3">
             <a:extLst>
               <a:ext uri="{96DAC541-7B7A-43D3-8B79-37D633B846F1}">
-                <asvg:svgBlip xmlns:asvg="http://schemas.microsoft.com/office/drawing/2016/SVG/main" r:embed="rId4"/>
+                <asvg:svgBlip xmlns:asvg="http://schemas.microsoft.com/office/drawing/2016/SVG/main" xmlns="" r:embed="rId4"/>
               </a:ext>
             </a:extLst>
           </a:blip>
@@ -1331,7 +1331,7 @@
           <a:blip r:embed="rId5">
             <a:extLst>
               <a:ext uri="{96DAC541-7B7A-43D3-8B79-37D633B846F1}">
-                <asvg:svgBlip xmlns:asvg="http://schemas.microsoft.com/office/drawing/2016/SVG/main" r:embed="rId6"/>
+                <asvg:svgBlip xmlns:asvg="http://schemas.microsoft.com/office/drawing/2016/SVG/main" xmlns="" r:embed="rId6"/>
               </a:ext>
             </a:extLst>
           </a:blip>
@@ -1360,7 +1360,7 @@
           <a:blip r:embed="rId7">
             <a:extLst>
               <a:ext uri="{96DAC541-7B7A-43D3-8B79-37D633B846F1}">
-                <asvg:svgBlip xmlns:asvg="http://schemas.microsoft.com/office/drawing/2016/SVG/main" r:embed="rId8"/>
+                <asvg:svgBlip xmlns:asvg="http://schemas.microsoft.com/office/drawing/2016/SVG/main" xmlns="" r:embed="rId8"/>
               </a:ext>
             </a:extLst>
           </a:blip>
@@ -1389,7 +1389,7 @@
           <a:blip r:embed="rId9">
             <a:extLst>
               <a:ext uri="{96DAC541-7B7A-43D3-8B79-37D633B846F1}">
-                <asvg:svgBlip xmlns:asvg="http://schemas.microsoft.com/office/drawing/2016/SVG/main" r:embed="rId10"/>
+                <asvg:svgBlip xmlns:asvg="http://schemas.microsoft.com/office/drawing/2016/SVG/main" xmlns="" r:embed="rId10"/>
               </a:ext>
             </a:extLst>
           </a:blip>
@@ -1693,7 +1693,7 @@
           <a:blip r:embed="rId3">
             <a:extLst>
               <a:ext uri="{96DAC541-7B7A-43D3-8B79-37D633B846F1}">
-                <asvg:svgBlip xmlns:asvg="http://schemas.microsoft.com/office/drawing/2016/SVG/main" r:embed="rId4"/>
+                <asvg:svgBlip xmlns:asvg="http://schemas.microsoft.com/office/drawing/2016/SVG/main" xmlns="" r:embed="rId4"/>
               </a:ext>
             </a:extLst>
           </a:blip>
@@ -1745,7 +1745,7 @@
           <a:blip r:embed="rId6">
             <a:extLst>
               <a:ext uri="{96DAC541-7B7A-43D3-8B79-37D633B846F1}">
-                <asvg:svgBlip xmlns:asvg="http://schemas.microsoft.com/office/drawing/2016/SVG/main" r:embed="rId7"/>
+                <asvg:svgBlip xmlns:asvg="http://schemas.microsoft.com/office/drawing/2016/SVG/main" xmlns="" r:embed="rId7"/>
               </a:ext>
             </a:extLst>
           </a:blip>
@@ -1774,7 +1774,7 @@
           <a:blip r:embed="rId8">
             <a:extLst>
               <a:ext uri="{96DAC541-7B7A-43D3-8B79-37D633B846F1}">
-                <asvg:svgBlip xmlns:asvg="http://schemas.microsoft.com/office/drawing/2016/SVG/main" r:embed="rId9"/>
+                <asvg:svgBlip xmlns:asvg="http://schemas.microsoft.com/office/drawing/2016/SVG/main" xmlns="" r:embed="rId9"/>
               </a:ext>
             </a:extLst>
           </a:blip>
@@ -1941,7 +1941,7 @@
           <a:blip r:embed="rId3">
             <a:extLst>
               <a:ext uri="{96DAC541-7B7A-43D3-8B79-37D633B846F1}">
-                <asvg:svgBlip xmlns:asvg="http://schemas.microsoft.com/office/drawing/2016/SVG/main" r:embed="rId4"/>
+                <asvg:svgBlip xmlns:asvg="http://schemas.microsoft.com/office/drawing/2016/SVG/main" xmlns="" r:embed="rId4"/>
               </a:ext>
             </a:extLst>
           </a:blip>
@@ -1993,7 +1993,7 @@
           <a:blip r:embed="rId6">
             <a:extLst>
               <a:ext uri="{96DAC541-7B7A-43D3-8B79-37D633B846F1}">
-                <asvg:svgBlip xmlns:asvg="http://schemas.microsoft.com/office/drawing/2016/SVG/main" r:embed="rId7"/>
+                <asvg:svgBlip xmlns:asvg="http://schemas.microsoft.com/office/drawing/2016/SVG/main" xmlns="" r:embed="rId7"/>
               </a:ext>
             </a:extLst>
           </a:blip>
@@ -2022,7 +2022,7 @@
           <a:blip r:embed="rId8">
             <a:extLst>
               <a:ext uri="{96DAC541-7B7A-43D3-8B79-37D633B846F1}">
-                <asvg:svgBlip xmlns:asvg="http://schemas.microsoft.com/office/drawing/2016/SVG/main" r:embed="rId9"/>
+                <asvg:svgBlip xmlns:asvg="http://schemas.microsoft.com/office/drawing/2016/SVG/main" xmlns="" r:embed="rId9"/>
               </a:ext>
             </a:extLst>
           </a:blip>
@@ -2051,7 +2051,7 @@
           <a:blip r:embed="rId10">
             <a:extLst>
               <a:ext uri="{96DAC541-7B7A-43D3-8B79-37D633B846F1}">
-                <asvg:svgBlip xmlns:asvg="http://schemas.microsoft.com/office/drawing/2016/SVG/main" r:embed="rId11"/>
+                <asvg:svgBlip xmlns:asvg="http://schemas.microsoft.com/office/drawing/2016/SVG/main" xmlns="" r:embed="rId11"/>
               </a:ext>
             </a:extLst>
           </a:blip>
@@ -2447,7 +2447,7 @@
           <a:blip r:embed="rId3">
             <a:extLst>
               <a:ext uri="{96DAC541-7B7A-43D3-8B79-37D633B846F1}">
-                <asvg:svgBlip xmlns:asvg="http://schemas.microsoft.com/office/drawing/2016/SVG/main" r:embed="rId4"/>
+                <asvg:svgBlip xmlns:asvg="http://schemas.microsoft.com/office/drawing/2016/SVG/main" xmlns="" r:embed="rId4"/>
               </a:ext>
             </a:extLst>
           </a:blip>
@@ -2476,7 +2476,7 @@
           <a:blip r:embed="rId5">
             <a:extLst>
               <a:ext uri="{96DAC541-7B7A-43D3-8B79-37D633B846F1}">
-                <asvg:svgBlip xmlns:asvg="http://schemas.microsoft.com/office/drawing/2016/SVG/main" r:embed="rId6"/>
+                <asvg:svgBlip xmlns:asvg="http://schemas.microsoft.com/office/drawing/2016/SVG/main" xmlns="" r:embed="rId6"/>
               </a:ext>
             </a:extLst>
           </a:blip>
@@ -2767,7 +2767,7 @@
           <a:blip r:embed="rId3">
             <a:extLst>
               <a:ext uri="{96DAC541-7B7A-43D3-8B79-37D633B846F1}">
-                <asvg:svgBlip xmlns:asvg="http://schemas.microsoft.com/office/drawing/2016/SVG/main" r:embed="rId4"/>
+                <asvg:svgBlip xmlns:asvg="http://schemas.microsoft.com/office/drawing/2016/SVG/main" xmlns="" r:embed="rId4"/>
               </a:ext>
             </a:extLst>
           </a:blip>
@@ -2819,7 +2819,7 @@
           <a:blip r:embed="rId6">
             <a:extLst>
               <a:ext uri="{96DAC541-7B7A-43D3-8B79-37D633B846F1}">
-                <asvg:svgBlip xmlns:asvg="http://schemas.microsoft.com/office/drawing/2016/SVG/main" r:embed="rId7"/>
+                <asvg:svgBlip xmlns:asvg="http://schemas.microsoft.com/office/drawing/2016/SVG/main" xmlns="" r:embed="rId7"/>
               </a:ext>
             </a:extLst>
           </a:blip>
@@ -2919,7 +2919,29 @@
                 <a:ea typeface="Comfortaa Regular" pitchFamily="34" charset="-122"/>
                 <a:cs typeface="Comfortaa Regular" pitchFamily="34" charset="-120"/>
               </a:rPr>
-              <a:t>LET’S JUMP INTO
+              <a:t>LET’S </a:t>
+            </a:r>
+            <a:r>
+              <a:rPr lang="en-US" sz="5400" b="0" i="0" kern="0" spc="3456" dirty="0" smtClean="0">
+                <a:solidFill>
+                  <a:srgbClr val="2C3C45"/>
+                </a:solidFill>
+                <a:latin typeface="Comfortaa Regular" pitchFamily="34" charset="0"/>
+                <a:ea typeface="Comfortaa Regular" pitchFamily="34" charset="-122"/>
+                <a:cs typeface="Comfortaa Regular" pitchFamily="34" charset="-120"/>
+              </a:rPr>
+              <a:t>JUMP TO</a:t>
+            </a:r>
+            <a:r>
+              <a:rPr lang="en-US" sz="5400" b="0" i="0" kern="0" spc="3456" dirty="0">
+                <a:solidFill>
+                  <a:srgbClr val="2C3C45"/>
+                </a:solidFill>
+                <a:latin typeface="Comfortaa Regular" pitchFamily="34" charset="0"/>
+                <a:ea typeface="Comfortaa Regular" pitchFamily="34" charset="-122"/>
+                <a:cs typeface="Comfortaa Regular" pitchFamily="34" charset="-120"/>
+              </a:rPr>
+              <a:t>
 THE PROJECT!</a:t>
             </a:r>
             <a:endParaRPr lang="en-US" sz="5400" dirty="0"/>

</xml_diff>